<commit_message>
made changes to ppt - final
</commit_message>
<xml_diff>
--- a/RoommateReminderPpt.pptx
+++ b/RoommateReminderPpt.pptx
@@ -13,8 +13,9 @@
     <p:sldId id="262" r:id="rId7"/>
     <p:sldId id="264" r:id="rId8"/>
     <p:sldId id="263" r:id="rId9"/>
-    <p:sldId id="260" r:id="rId10"/>
-    <p:sldId id="261" r:id="rId11"/>
+    <p:sldId id="266" r:id="rId10"/>
+    <p:sldId id="260" r:id="rId11"/>
+    <p:sldId id="261" r:id="rId12"/>
   </p:sldIdLst>
   <p:sldSz cx="12192000" cy="6858000"/>
   <p:notesSz cx="6858000" cy="9144000"/>
@@ -9865,6 +9866,165 @@
       </p:grpSpPr>
       <p:sp>
         <p:nvSpPr>
+          <p:cNvPr id="15" name="Content Placeholder 2">
+            <a:extLst>
+              <a:ext uri="{FF2B5EF4-FFF2-40B4-BE49-F238E27FC236}">
+                <a16:creationId xmlns:a16="http://schemas.microsoft.com/office/drawing/2014/main" id="{16B74AD2-B083-4EEA-BAC6-7C8DDE5E28F1}"/>
+              </a:ext>
+            </a:extLst>
+          </p:cNvPr>
+          <p:cNvSpPr>
+            <a:spLocks noGrp="1"/>
+          </p:cNvSpPr>
+          <p:nvPr>
+            <p:ph idx="1"/>
+          </p:nvPr>
+        </p:nvSpPr>
+        <p:spPr>
+          <a:xfrm>
+            <a:off x="6090574" y="2421682"/>
+            <a:ext cx="4977578" cy="3639289"/>
+          </a:xfrm>
+        </p:spPr>
+        <p:txBody>
+          <a:bodyPr anchor="ctr">
+            <a:normAutofit/>
+          </a:bodyPr>
+          <a:lstStyle/>
+          <a:p>
+            <a:pPr marL="0" indent="0">
+              <a:buNone/>
+            </a:pPr>
+            <a:r>
+              <a:rPr lang="en-US" sz="2000" b="1" dirty="0">
+                <a:solidFill>
+                  <a:srgbClr val="000000"/>
+                </a:solidFill>
+                <a:latin typeface="Caveat"/>
+                <a:ea typeface="Caveat"/>
+                <a:cs typeface="Caveat"/>
+                <a:sym typeface="Caveat"/>
+              </a:rPr>
+              <a:t>			</a:t>
+            </a:r>
+          </a:p>
+          <a:p>
+            <a:pPr marL="0" indent="0">
+              <a:buNone/>
+            </a:pPr>
+            <a:r>
+              <a:rPr lang="en-US" sz="2000" b="1" dirty="0">
+                <a:solidFill>
+                  <a:srgbClr val="000000"/>
+                </a:solidFill>
+                <a:latin typeface="Caveat"/>
+                <a:ea typeface="Caveat"/>
+                <a:cs typeface="Caveat"/>
+                <a:sym typeface="Caveat"/>
+              </a:rPr>
+              <a:t>	</a:t>
+            </a:r>
+            <a:r>
+              <a:rPr lang="en-US" sz="2500" b="1" i="1" dirty="0">
+                <a:solidFill>
+                  <a:schemeClr val="accent1"/>
+                </a:solidFill>
+                <a:latin typeface="Caveat"/>
+                <a:ea typeface="Caveat"/>
+                <a:cs typeface="Caveat"/>
+                <a:sym typeface="Caveat"/>
+              </a:rPr>
+              <a:t>ANY QUESTIONS????</a:t>
+            </a:r>
+          </a:p>
+          <a:p>
+            <a:endParaRPr lang="en-US" sz="2000" dirty="0">
+              <a:solidFill>
+                <a:srgbClr val="000000"/>
+              </a:solidFill>
+            </a:endParaRPr>
+          </a:p>
+        </p:txBody>
+      </p:sp>
+      <p:pic>
+        <p:nvPicPr>
+          <p:cNvPr id="7" name="Graphic 6" descr="Questions">
+            <a:extLst>
+              <a:ext uri="{FF2B5EF4-FFF2-40B4-BE49-F238E27FC236}">
+                <a16:creationId xmlns:a16="http://schemas.microsoft.com/office/drawing/2014/main" id="{ED83A0DA-2965-42A4-B68A-82465CB864BF}"/>
+              </a:ext>
+            </a:extLst>
+          </p:cNvPr>
+          <p:cNvPicPr>
+            <a:picLocks noChangeAspect="1"/>
+          </p:cNvPicPr>
+          <p:nvPr/>
+        </p:nvPicPr>
+        <p:blipFill>
+          <a:blip r:embed="rId2">
+            <a:extLst>
+              <a:ext uri="{28A0092B-C50C-407E-A947-70E740481C1C}">
+                <a14:useLocalDpi xmlns:a14="http://schemas.microsoft.com/office/drawing/2010/main" val="0"/>
+              </a:ext>
+              <a:ext uri="{96DAC541-7B7A-43D3-8B79-37D633B846F1}">
+                <asvg:svgBlip xmlns:asvg="http://schemas.microsoft.com/office/drawing/2016/SVG/main" r:embed="rId3"/>
+              </a:ext>
+            </a:extLst>
+          </a:blip>
+          <a:stretch>
+            <a:fillRect/>
+          </a:stretch>
+        </p:blipFill>
+        <p:spPr>
+          <a:xfrm>
+            <a:off x="450254" y="1629089"/>
+            <a:ext cx="3620021" cy="3620021"/>
+          </a:xfrm>
+          <a:prstGeom prst="rect">
+            <a:avLst/>
+          </a:prstGeom>
+        </p:spPr>
+      </p:pic>
+    </p:spTree>
+    <p:extLst>
+      <p:ext uri="{BB962C8B-B14F-4D97-AF65-F5344CB8AC3E}">
+        <p14:creationId xmlns:p14="http://schemas.microsoft.com/office/powerpoint/2010/main" val="1179613415"/>
+      </p:ext>
+    </p:extLst>
+  </p:cSld>
+  <p:clrMapOvr>
+    <a:masterClrMapping/>
+  </p:clrMapOvr>
+</p:sld>
+</file>
+
+<file path=ppt/slides/slide11.xml><?xml version="1.0" encoding="utf-8"?>
+<p:sld xmlns:a="http://schemas.openxmlformats.org/drawingml/2006/main" xmlns:r="http://schemas.openxmlformats.org/officeDocument/2006/relationships" xmlns:p="http://schemas.openxmlformats.org/presentationml/2006/main">
+  <p:cSld>
+    <p:bg>
+      <p:bgPr>
+        <a:solidFill>
+          <a:schemeClr val="bg1"/>
+        </a:solidFill>
+        <a:effectLst/>
+      </p:bgPr>
+    </p:bg>
+    <p:spTree>
+      <p:nvGrpSpPr>
+        <p:cNvPr id="1" name=""/>
+        <p:cNvGrpSpPr/>
+        <p:nvPr/>
+      </p:nvGrpSpPr>
+      <p:grpSpPr>
+        <a:xfrm>
+          <a:off x="0" y="0"/>
+          <a:ext cx="0" cy="0"/>
+          <a:chOff x="0" y="0"/>
+          <a:chExt cx="0" cy="0"/>
+        </a:xfrm>
+      </p:grpSpPr>
+      <p:sp>
+        <p:nvSpPr>
           <p:cNvPr id="3" name="Content Placeholder 2">
             <a:extLst>
               <a:ext uri="{FF2B5EF4-FFF2-40B4-BE49-F238E27FC236}">
@@ -11199,7 +11359,7 @@
           <a:p>
             <a:r>
               <a:rPr lang="en-US" i="1" dirty="0"/>
-              <a:t> All the roommates to register to create an account and login to a user account. After this, the admin can create a household or with a unique 5-digit house pin to set up their house. Other roommates can enter the unique 5 digit PIN to enter the house.</a:t>
+              <a:t> All the roommates will create an account and login to the app. After this, the admin can create a household or with a unique 5-digit house pin to set up their house. Other roommates can enter the unique 5 digit PIN to enter the house.</a:t>
             </a:r>
           </a:p>
           <a:p>
@@ -14223,14 +14383,6 @@
 <file path=ppt/slides/slide9.xml><?xml version="1.0" encoding="utf-8"?>
 <p:sld xmlns:a="http://schemas.openxmlformats.org/drawingml/2006/main" xmlns:r="http://schemas.openxmlformats.org/officeDocument/2006/relationships" xmlns:p="http://schemas.openxmlformats.org/presentationml/2006/main">
   <p:cSld>
-    <p:bg>
-      <p:bgPr>
-        <a:solidFill>
-          <a:schemeClr val="bg1"/>
-        </a:solidFill>
-        <a:effectLst/>
-      </p:bgPr>
-    </p:bg>
     <p:spTree>
       <p:nvGrpSpPr>
         <p:cNvPr id="1" name=""/>
@@ -14247,10 +14399,38 @@
       </p:grpSpPr>
       <p:sp>
         <p:nvSpPr>
-          <p:cNvPr id="15" name="Content Placeholder 2">
+          <p:cNvPr id="2" name="Title 1">
             <a:extLst>
               <a:ext uri="{FF2B5EF4-FFF2-40B4-BE49-F238E27FC236}">
-                <a16:creationId xmlns:a16="http://schemas.microsoft.com/office/drawing/2014/main" id="{16B74AD2-B083-4EEA-BAC6-7C8DDE5E28F1}"/>
+                <a16:creationId xmlns:a16="http://schemas.microsoft.com/office/drawing/2014/main" id="{4185A7AF-C393-4FB0-A791-FFCEC8765AEE}"/>
+              </a:ext>
+            </a:extLst>
+          </p:cNvPr>
+          <p:cNvSpPr>
+            <a:spLocks noGrp="1"/>
+          </p:cNvSpPr>
+          <p:nvPr>
+            <p:ph type="title"/>
+          </p:nvPr>
+        </p:nvSpPr>
+        <p:spPr/>
+        <p:txBody>
+          <a:bodyPr/>
+          <a:lstStyle/>
+          <a:p>
+            <a:r>
+              <a:rPr lang="en-US" dirty="0"/>
+              <a:t>Work Distribution</a:t>
+            </a:r>
+          </a:p>
+        </p:txBody>
+      </p:sp>
+      <p:sp>
+        <p:nvSpPr>
+          <p:cNvPr id="3" name="Content Placeholder 2">
+            <a:extLst>
+              <a:ext uri="{FF2B5EF4-FFF2-40B4-BE49-F238E27FC236}">
+                <a16:creationId xmlns:a16="http://schemas.microsoft.com/office/drawing/2014/main" id="{A88A705B-42DB-4867-9BEE-88B7C5B6A87F}"/>
               </a:ext>
             </a:extLst>
           </p:cNvPr>
@@ -14261,115 +14441,139 @@
             <p:ph idx="1"/>
           </p:nvPr>
         </p:nvSpPr>
-        <p:spPr>
-          <a:xfrm>
-            <a:off x="6090574" y="2421682"/>
-            <a:ext cx="4977578" cy="3639289"/>
-          </a:xfrm>
-        </p:spPr>
+        <p:spPr/>
         <p:txBody>
-          <a:bodyPr anchor="ctr">
-            <a:normAutofit/>
+          <a:bodyPr>
+            <a:normAutofit fontScale="62500" lnSpcReduction="20000"/>
           </a:bodyPr>
           <a:lstStyle/>
           <a:p>
-            <a:pPr marL="0" indent="0">
+            <a:r>
+              <a:rPr lang="en-US" dirty="0" err="1"/>
+              <a:t>Alekya</a:t>
+            </a:r>
+            <a:endParaRPr lang="en-US" dirty="0"/>
+          </a:p>
+          <a:p>
+            <a:pPr lvl="1"/>
+            <a:r>
+              <a:rPr lang="en-US" dirty="0"/>
+              <a:t>Project Manager – divided up tasks</a:t>
+            </a:r>
+          </a:p>
+          <a:p>
+            <a:pPr lvl="1"/>
+            <a:r>
+              <a:rPr lang="en-US" dirty="0"/>
+              <a:t>Organized Firebase data</a:t>
+            </a:r>
+          </a:p>
+          <a:p>
+            <a:pPr lvl="1"/>
+            <a:r>
+              <a:rPr lang="en-US" dirty="0"/>
+              <a:t>Created item service for populating bills, chores, grocery lists.</a:t>
+            </a:r>
+          </a:p>
+          <a:p>
+            <a:r>
+              <a:rPr lang="en-US" dirty="0"/>
+              <a:t>Justin</a:t>
+            </a:r>
+          </a:p>
+          <a:p>
+            <a:pPr lvl="1"/>
+            <a:r>
+              <a:rPr lang="en-US" dirty="0"/>
+              <a:t>Created React native project, Firebase, source control</a:t>
+            </a:r>
+          </a:p>
+          <a:p>
+            <a:pPr lvl="1"/>
+            <a:r>
+              <a:rPr lang="en-US" dirty="0"/>
+              <a:t>Set up navigation for app between screens</a:t>
+            </a:r>
+          </a:p>
+          <a:p>
+            <a:pPr lvl="1"/>
+            <a:r>
+              <a:rPr lang="en-US" dirty="0"/>
+              <a:t>Set up login system for users and households</a:t>
+            </a:r>
+          </a:p>
+          <a:p>
+            <a:r>
+              <a:rPr lang="en-US" dirty="0"/>
+              <a:t>Kalam</a:t>
+            </a:r>
+          </a:p>
+          <a:p>
+            <a:pPr lvl="1"/>
+            <a:r>
+              <a:rPr lang="en-US" dirty="0"/>
+              <a:t>Created all Add/View bills, chores, groceries pages</a:t>
+            </a:r>
+          </a:p>
+          <a:p>
+            <a:pPr lvl="1"/>
+            <a:r>
+              <a:rPr lang="en-US" dirty="0"/>
+              <a:t>Created the </a:t>
+            </a:r>
+            <a:r>
+              <a:rPr lang="en-US" dirty="0" err="1"/>
+              <a:t>EditProfile</a:t>
+            </a:r>
+            <a:r>
+              <a:rPr lang="en-US" dirty="0"/>
+              <a:t> functionality</a:t>
+            </a:r>
+          </a:p>
+          <a:p>
+            <a:r>
+              <a:rPr lang="en-US" dirty="0" err="1"/>
+              <a:t>Navyanjali</a:t>
+            </a:r>
+            <a:endParaRPr lang="en-US" dirty="0"/>
+          </a:p>
+          <a:p>
+            <a:pPr lvl="1"/>
+            <a:r>
+              <a:rPr lang="en-US" dirty="0"/>
+              <a:t>Design, created presentation</a:t>
+            </a:r>
+          </a:p>
+          <a:p>
+            <a:r>
+              <a:rPr lang="en-US" dirty="0" err="1"/>
+              <a:t>Sujal</a:t>
+            </a:r>
+            <a:endParaRPr lang="en-US" dirty="0"/>
+          </a:p>
+          <a:p>
+            <a:pPr lvl="1"/>
+            <a:r>
+              <a:rPr lang="en-US" dirty="0"/>
+              <a:t>Worked on design/colors as well </a:t>
+            </a:r>
+          </a:p>
+          <a:p>
+            <a:pPr marL="57150" indent="0">
               <a:buNone/>
             </a:pPr>
-            <a:r>
-              <a:rPr lang="en-US" sz="2000" b="1" dirty="0">
-                <a:solidFill>
-                  <a:srgbClr val="000000"/>
-                </a:solidFill>
-                <a:latin typeface="Caveat"/>
-                <a:ea typeface="Caveat"/>
-                <a:cs typeface="Caveat"/>
-                <a:sym typeface="Caveat"/>
-              </a:rPr>
-              <a:t>			</a:t>
-            </a:r>
-          </a:p>
-          <a:p>
-            <a:pPr marL="0" indent="0">
-              <a:buNone/>
-            </a:pPr>
-            <a:r>
-              <a:rPr lang="en-US" sz="2000" b="1" dirty="0">
-                <a:solidFill>
-                  <a:srgbClr val="000000"/>
-                </a:solidFill>
-                <a:latin typeface="Caveat"/>
-                <a:ea typeface="Caveat"/>
-                <a:cs typeface="Caveat"/>
-                <a:sym typeface="Caveat"/>
-              </a:rPr>
-              <a:t>	</a:t>
-            </a:r>
-            <a:r>
-              <a:rPr lang="en-US" sz="2500" b="1" i="1" dirty="0">
-                <a:solidFill>
-                  <a:schemeClr val="accent1"/>
-                </a:solidFill>
-                <a:latin typeface="Caveat"/>
-                <a:ea typeface="Caveat"/>
-                <a:cs typeface="Caveat"/>
-                <a:sym typeface="Caveat"/>
-              </a:rPr>
-              <a:t>ANY QUESTIONS????</a:t>
-            </a:r>
-          </a:p>
-          <a:p>
-            <a:endParaRPr lang="en-US" sz="2000" dirty="0">
-              <a:solidFill>
-                <a:srgbClr val="000000"/>
-              </a:solidFill>
-            </a:endParaRPr>
+            <a:endParaRPr lang="en-US" dirty="0"/>
+          </a:p>
+          <a:p>
+            <a:pPr lvl="1"/>
+            <a:endParaRPr lang="en-US" dirty="0"/>
           </a:p>
         </p:txBody>
       </p:sp>
-      <p:pic>
-        <p:nvPicPr>
-          <p:cNvPr id="7" name="Graphic 6" descr="Questions">
-            <a:extLst>
-              <a:ext uri="{FF2B5EF4-FFF2-40B4-BE49-F238E27FC236}">
-                <a16:creationId xmlns:a16="http://schemas.microsoft.com/office/drawing/2014/main" id="{ED83A0DA-2965-42A4-B68A-82465CB864BF}"/>
-              </a:ext>
-            </a:extLst>
-          </p:cNvPr>
-          <p:cNvPicPr>
-            <a:picLocks noChangeAspect="1"/>
-          </p:cNvPicPr>
-          <p:nvPr/>
-        </p:nvPicPr>
-        <p:blipFill>
-          <a:blip r:embed="rId2">
-            <a:extLst>
-              <a:ext uri="{28A0092B-C50C-407E-A947-70E740481C1C}">
-                <a14:useLocalDpi xmlns:a14="http://schemas.microsoft.com/office/drawing/2010/main" val="0"/>
-              </a:ext>
-              <a:ext uri="{96DAC541-7B7A-43D3-8B79-37D633B846F1}">
-                <asvg:svgBlip xmlns:asvg="http://schemas.microsoft.com/office/drawing/2016/SVG/main" r:embed="rId3"/>
-              </a:ext>
-            </a:extLst>
-          </a:blip>
-          <a:stretch>
-            <a:fillRect/>
-          </a:stretch>
-        </p:blipFill>
-        <p:spPr>
-          <a:xfrm>
-            <a:off x="450254" y="1629089"/>
-            <a:ext cx="3620021" cy="3620021"/>
-          </a:xfrm>
-          <a:prstGeom prst="rect">
-            <a:avLst/>
-          </a:prstGeom>
-        </p:spPr>
-      </p:pic>
     </p:spTree>
     <p:extLst>
       <p:ext uri="{BB962C8B-B14F-4D97-AF65-F5344CB8AC3E}">
-        <p14:creationId xmlns:p14="http://schemas.microsoft.com/office/powerpoint/2010/main" val="1179613415"/>
+        <p14:creationId xmlns:p14="http://schemas.microsoft.com/office/powerpoint/2010/main" val="1488241238"/>
       </p:ext>
     </p:extLst>
   </p:cSld>

</xml_diff>